<commit_message>
fix some typos. closes #41
</commit_message>
<xml_diff>
--- a/_build/slides_pptx/07-Classification.pptx
+++ b/_build/slides_pptx/07-Classification.pptx
@@ -253,7 +253,7 @@
           <a:p>
             <a:fld id="{617C146D-62F7-43FA-9E74-FCA69FF93FC6}" type="datetimeFigureOut">
               <a:rPr lang="en-US" smtClean="0"/>
-              <a:t>10/28/2020</a:t>
+              <a:t>3/18/2021</a:t>
             </a:fld>
             <a:endParaRPr lang="en-US"/>
           </a:p>
@@ -419,7 +419,7 @@
           <a:p>
             <a:fld id="{5002CEDA-5074-4F67-AF85-393C0A79EFD3}" type="datetimeFigureOut">
               <a:rPr lang="de-DE" smtClean="0"/>
-              <a:t>28.10.2020</a:t>
+              <a:t>18.03.2021</a:t>
             </a:fld>
             <a:endParaRPr lang="de-DE"/>
           </a:p>
@@ -12921,8 +12921,8 @@
           </a:p>
         </p:txBody>
       </p:sp>
-      <mc:AlternateContent xmlns:mc="http://schemas.openxmlformats.org/markup-compatibility/2006" xmlns:a14="http://schemas.microsoft.com/office/drawing/2010/main">
-        <mc:Choice Requires="a14">
+      <mc:AlternateContent xmlns:mc="http://schemas.openxmlformats.org/markup-compatibility/2006">
+        <mc:Choice xmlns:a14="http://schemas.microsoft.com/office/drawing/2010/main" Requires="a14">
           <p:sp>
             <p:nvSpPr>
               <p:cNvPr id="3" name="Inhaltsplatzhalter 2"/>
@@ -14190,13 +14190,13 @@
                                   <m:t>+</m:t>
                                 </m:r>
                                 <m:r>
-                                  <a:rPr lang="de-DE" b="0" i="1" smtClean="0">
+                                  <a:rPr lang="en-US" b="0" i="1" smtClean="0">
                                     <a:solidFill>
                                       <a:srgbClr val="002060"/>
                                     </a:solidFill>
                                     <a:latin typeface="Cambria Math" panose="02040503050406030204" pitchFamily="18" charset="0"/>
                                   </a:rPr>
-                                  <m:t>𝑇</m:t>
+                                  <m:t>𝐹</m:t>
                                 </m:r>
                                 <m:sSub>
                                   <m:sSubPr>
@@ -14278,7 +14278,7 @@
             </p:txBody>
           </p:sp>
         </mc:Choice>
-        <mc:Fallback xmlns="">
+        <mc:Fallback>
           <p:sp>
             <p:nvSpPr>
               <p:cNvPr id="3" name="Inhaltsplatzhalter 2"/>
@@ -14302,7 +14302,7 @@
               <a:lstStyle/>
               <a:p>
                 <a:r>
-                  <a:rPr lang="de-DE">
+                  <a:rPr lang="en-DE">
                     <a:noFill/>
                   </a:rPr>
                   <a:t> </a:t>

</xml_diff>